<commit_message>
Cambios de graficos y actualizacion del pptx
Cambios en los graficos de regresion, y actualizacion en el pptx
</commit_message>
<xml_diff>
--- a/05_Mineria_De_Datos/ProyectoFinal/Proyecto Mineria de Datos.pptx
+++ b/05_Mineria_De_Datos/ProyectoFinal/Proyecto Mineria de Datos.pptx
@@ -265,7 +265,7 @@
       <p15:sldGuideLst xmlns:p15="http://schemas.microsoft.com/office/powerpoint/2012/main"/>
     </p:ext>
     <p:ext uri="http://customooxmlschemas.google.com/">
-      <go:slidesCustomData xmlns="" xmlns:mc="http://schemas.openxmlformats.org/markup-compatibility/2006" xmlns:mv="urn:schemas-microsoft-com:mac:vml" xmlns:c="http://schemas.openxmlformats.org/drawingml/2006/chart" xmlns:dgm="http://schemas.openxmlformats.org/drawingml/2006/diagram" xmlns:o="urn:schemas-microsoft-com:office:office" xmlns:v="urn:schemas-microsoft-com:vml" xmlns:pvml="urn:schemas-microsoft-com:office:powerpoint" xmlns:com="http://schemas.openxmlformats.org/drawingml/2006/compatibility" xmlns:p14="http://schemas.microsoft.com/office/powerpoint/2010/main" xmlns:p15="http://schemas.microsoft.com/office/powerpoint/2012/main" xmlns:go="http://customooxmlschemas.google.com/" r:id="rId23" roundtripDataSignature="AMtx7mjx0UdlmdacI7Fe/GkP4WwI2BgW2Q=="/>
+      <go:slidesCustomData xmlns:go="http://customooxmlschemas.google.com/" xmlns:p15="http://schemas.microsoft.com/office/powerpoint/2012/main" xmlns:p14="http://schemas.microsoft.com/office/powerpoint/2010/main" xmlns:com="http://schemas.openxmlformats.org/drawingml/2006/compatibility" xmlns:pvml="urn:schemas-microsoft-com:office:powerpoint" xmlns:v="urn:schemas-microsoft-com:vml" xmlns:o="urn:schemas-microsoft-com:office:office" xmlns:dgm="http://schemas.openxmlformats.org/drawingml/2006/diagram" xmlns:c="http://schemas.openxmlformats.org/drawingml/2006/chart" xmlns:mv="urn:schemas-microsoft-com:mac:vml" xmlns:mc="http://schemas.openxmlformats.org/markup-compatibility/2006" xmlns="" r:id="rId23" roundtripDataSignature="AMtx7mjx0UdlmdacI7Fe/GkP4WwI2BgW2Q=="/>
     </p:ext>
   </p:extLst>
 </p:presentation>
@@ -274,7 +274,7 @@
 <file path=ppt/revisionInfo.xml><?xml version="1.0" encoding="utf-8"?>
 <p1510:revInfo xmlns:a="http://schemas.openxmlformats.org/drawingml/2006/main" xmlns:r="http://schemas.openxmlformats.org/officeDocument/2006/relationships" xmlns:p1510="http://schemas.microsoft.com/office/powerpoint/2015/10/main">
   <p1510:revLst>
-    <p1510:client id="{37B865AB-2315-43C0-AD4C-16E4559F7C7A}" v="27" dt="2020-06-01T03:22:54.189"/>
+    <p1510:client id="{37B865AB-2315-43C0-AD4C-16E4559F7C7A}" v="36" dt="2020-06-01T15:35:21.249"/>
   </p1510:revLst>
 </p1510:revInfo>
 </file>
@@ -284,7 +284,7 @@
   <pc:docChgLst>
     <pc:chgData name="Jose Aguilar" userId="4edcd7cbe4616803" providerId="LiveId" clId="{37B865AB-2315-43C0-AD4C-16E4559F7C7A}"/>
     <pc:docChg chg="undo custSel addSld delSld modSld">
-      <pc:chgData name="Jose Aguilar" userId="4edcd7cbe4616803" providerId="LiveId" clId="{37B865AB-2315-43C0-AD4C-16E4559F7C7A}" dt="2020-06-01T03:26:10.993" v="1294" actId="478"/>
+      <pc:chgData name="Jose Aguilar" userId="4edcd7cbe4616803" providerId="LiveId" clId="{37B865AB-2315-43C0-AD4C-16E4559F7C7A}" dt="2020-06-01T15:35:54.451" v="1315" actId="1036"/>
       <pc:docMkLst>
         <pc:docMk/>
       </pc:docMkLst>
@@ -505,6 +505,45 @@
           </ac:picMkLst>
         </pc:picChg>
       </pc:sldChg>
+      <pc:sldChg chg="addSp delSp modSp mod">
+        <pc:chgData name="Jose Aguilar" userId="4edcd7cbe4616803" providerId="LiveId" clId="{37B865AB-2315-43C0-AD4C-16E4559F7C7A}" dt="2020-06-01T15:35:21.248" v="1305" actId="14100"/>
+        <pc:sldMkLst>
+          <pc:docMk/>
+          <pc:sldMk cId="268223577" sldId="269"/>
+        </pc:sldMkLst>
+        <pc:picChg chg="del">
+          <ac:chgData name="Jose Aguilar" userId="4edcd7cbe4616803" providerId="LiveId" clId="{37B865AB-2315-43C0-AD4C-16E4559F7C7A}" dt="2020-06-01T15:34:29.968" v="1295" actId="478"/>
+          <ac:picMkLst>
+            <pc:docMk/>
+            <pc:sldMk cId="268223577" sldId="269"/>
+            <ac:picMk id="11" creationId="{411D7DCD-8B86-473A-9A6B-DDE6934A7AA1}"/>
+          </ac:picMkLst>
+        </pc:picChg>
+        <pc:picChg chg="del">
+          <ac:chgData name="Jose Aguilar" userId="4edcd7cbe4616803" providerId="LiveId" clId="{37B865AB-2315-43C0-AD4C-16E4559F7C7A}" dt="2020-06-01T15:34:47.655" v="1299" actId="478"/>
+          <ac:picMkLst>
+            <pc:docMk/>
+            <pc:sldMk cId="268223577" sldId="269"/>
+            <ac:picMk id="12" creationId="{E2A4EAE8-244B-499D-A440-2691BF326096}"/>
+          </ac:picMkLst>
+        </pc:picChg>
+        <pc:picChg chg="add mod">
+          <ac:chgData name="Jose Aguilar" userId="4edcd7cbe4616803" providerId="LiveId" clId="{37B865AB-2315-43C0-AD4C-16E4559F7C7A}" dt="2020-06-01T15:35:21.248" v="1305" actId="14100"/>
+          <ac:picMkLst>
+            <pc:docMk/>
+            <pc:sldMk cId="268223577" sldId="269"/>
+            <ac:picMk id="1026" creationId="{2701E393-1B98-4F5D-98C2-E249EF90D590}"/>
+          </ac:picMkLst>
+        </pc:picChg>
+        <pc:picChg chg="add mod">
+          <ac:chgData name="Jose Aguilar" userId="4edcd7cbe4616803" providerId="LiveId" clId="{37B865AB-2315-43C0-AD4C-16E4559F7C7A}" dt="2020-06-01T15:35:14.853" v="1303" actId="1076"/>
+          <ac:picMkLst>
+            <pc:docMk/>
+            <pc:sldMk cId="268223577" sldId="269"/>
+            <ac:picMk id="1028" creationId="{BC6207AE-2FD7-4FFB-A57D-983496975A34}"/>
+          </ac:picMkLst>
+        </pc:picChg>
+      </pc:sldChg>
       <pc:sldChg chg="del">
         <pc:chgData name="Jose Aguilar" userId="4edcd7cbe4616803" providerId="LiveId" clId="{37B865AB-2315-43C0-AD4C-16E4559F7C7A}" dt="2020-06-01T03:08:22.258" v="1081" actId="47"/>
         <pc:sldMkLst>
@@ -568,7 +607,7 @@
         </pc:picChg>
       </pc:sldChg>
       <pc:sldChg chg="addSp delSp modSp add mod">
-        <pc:chgData name="Jose Aguilar" userId="4edcd7cbe4616803" providerId="LiveId" clId="{37B865AB-2315-43C0-AD4C-16E4559F7C7A}" dt="2020-06-01T03:08:18.070" v="1080" actId="20577"/>
+        <pc:chgData name="Jose Aguilar" userId="4edcd7cbe4616803" providerId="LiveId" clId="{37B865AB-2315-43C0-AD4C-16E4559F7C7A}" dt="2020-06-01T15:35:54.451" v="1315" actId="1036"/>
         <pc:sldMkLst>
           <pc:docMk/>
           <pc:sldMk cId="1637354507" sldId="275"/>
@@ -622,7 +661,7 @@
           </ac:picMkLst>
         </pc:picChg>
         <pc:picChg chg="add mod">
-          <ac:chgData name="Jose Aguilar" userId="4edcd7cbe4616803" providerId="LiveId" clId="{37B865AB-2315-43C0-AD4C-16E4559F7C7A}" dt="2020-06-01T03:07:23.123" v="862" actId="1076"/>
+          <ac:chgData name="Jose Aguilar" userId="4edcd7cbe4616803" providerId="LiveId" clId="{37B865AB-2315-43C0-AD4C-16E4559F7C7A}" dt="2020-06-01T15:35:54.451" v="1315" actId="1036"/>
           <ac:picMkLst>
             <pc:docMk/>
             <pc:sldMk cId="1637354507" sldId="275"/>
@@ -23098,62 +23137,96 @@
       </p:sp>
       <p:pic>
         <p:nvPicPr>
-          <p:cNvPr id="11" name="Picture 10">
+          <p:cNvPr id="1026" name="Picture 2">
             <a:extLst>
               <a:ext uri="{FF2B5EF4-FFF2-40B4-BE49-F238E27FC236}">
-                <a16:creationId xmlns:a16="http://schemas.microsoft.com/office/drawing/2014/main" id="{411D7DCD-8B86-473A-9A6B-DDE6934A7AA1}"/>
+                <a16:creationId xmlns:a16="http://schemas.microsoft.com/office/drawing/2014/main" id="{2701E393-1B98-4F5D-98C2-E249EF90D590}"/>
               </a:ext>
             </a:extLst>
           </p:cNvPr>
           <p:cNvPicPr>
-            <a:picLocks noChangeAspect="1"/>
+            <a:picLocks noChangeAspect="1" noChangeArrowheads="1"/>
           </p:cNvPicPr>
           <p:nvPr/>
         </p:nvPicPr>
         <p:blipFill>
-          <a:blip r:embed="rId3"/>
+          <a:blip r:embed="rId3">
+            <a:extLst>
+              <a:ext uri="{28A0092B-C50C-407E-A947-70E740481C1C}">
+                <a14:useLocalDpi xmlns:a14="http://schemas.microsoft.com/office/drawing/2010/main" val="0"/>
+              </a:ext>
+            </a:extLst>
+          </a:blip>
+          <a:srcRect/>
           <a:stretch>
             <a:fillRect/>
           </a:stretch>
         </p:blipFill>
-        <p:spPr>
+        <p:spPr bwMode="auto">
           <a:xfrm>
-            <a:off x="827773" y="3429000"/>
-            <a:ext cx="4402956" cy="3255377"/>
+            <a:off x="184628" y="3189436"/>
+            <a:ext cx="5705111" cy="3260063"/>
           </a:xfrm>
           <a:prstGeom prst="rect">
             <a:avLst/>
           </a:prstGeom>
+          <a:noFill/>
+          <a:extLst>
+            <a:ext uri="{909E8E84-426E-40DD-AFC4-6F175D3DCCD1}">
+              <a14:hiddenFill xmlns:a14="http://schemas.microsoft.com/office/drawing/2010/main">
+                <a:solidFill>
+                  <a:srgbClr val="FFFFFF"/>
+                </a:solidFill>
+              </a14:hiddenFill>
+            </a:ext>
+          </a:extLst>
         </p:spPr>
       </p:pic>
       <p:pic>
         <p:nvPicPr>
-          <p:cNvPr id="12" name="Picture 11">
+          <p:cNvPr id="1028" name="Picture 4">
             <a:extLst>
               <a:ext uri="{FF2B5EF4-FFF2-40B4-BE49-F238E27FC236}">
-                <a16:creationId xmlns:a16="http://schemas.microsoft.com/office/drawing/2014/main" id="{E2A4EAE8-244B-499D-A440-2691BF326096}"/>
+                <a16:creationId xmlns:a16="http://schemas.microsoft.com/office/drawing/2014/main" id="{BC6207AE-2FD7-4FFB-A57D-983496975A34}"/>
               </a:ext>
             </a:extLst>
           </p:cNvPr>
           <p:cNvPicPr>
-            <a:picLocks noChangeAspect="1"/>
+            <a:picLocks noChangeAspect="1" noChangeArrowheads="1"/>
           </p:cNvPicPr>
           <p:nvPr/>
         </p:nvPicPr>
         <p:blipFill>
-          <a:blip r:embed="rId4"/>
+          <a:blip r:embed="rId4">
+            <a:extLst>
+              <a:ext uri="{28A0092B-C50C-407E-A947-70E740481C1C}">
+                <a14:useLocalDpi xmlns:a14="http://schemas.microsoft.com/office/drawing/2010/main" val="0"/>
+              </a:ext>
+            </a:extLst>
+          </a:blip>
+          <a:srcRect/>
           <a:stretch>
             <a:fillRect/>
           </a:stretch>
         </p:blipFill>
-        <p:spPr>
+        <p:spPr bwMode="auto">
           <a:xfrm>
-            <a:off x="6103118" y="3413066"/>
-            <a:ext cx="4402957" cy="3271311"/>
+            <a:off x="6053328" y="3267269"/>
+            <a:ext cx="5568903" cy="3182230"/>
           </a:xfrm>
           <a:prstGeom prst="rect">
             <a:avLst/>
           </a:prstGeom>
+          <a:noFill/>
+          <a:extLst>
+            <a:ext uri="{909E8E84-426E-40DD-AFC4-6F175D3DCCD1}">
+              <a14:hiddenFill xmlns:a14="http://schemas.microsoft.com/office/drawing/2010/main">
+                <a:solidFill>
+                  <a:srgbClr val="FFFFFF"/>
+                </a:solidFill>
+              </a14:hiddenFill>
+            </a:ext>
+          </a:extLst>
         </p:spPr>
       </p:pic>
     </p:spTree>
@@ -25328,7 +25401,7 @@
         </p:blipFill>
         <p:spPr>
           <a:xfrm>
-            <a:off x="1913374" y="3906283"/>
+            <a:off x="1913374" y="3975033"/>
             <a:ext cx="7597798" cy="1127858"/>
           </a:xfrm>
           <a:prstGeom prst="rect">

</xml_diff>